<commit_message>
immune cell population per patient
</commit_message>
<xml_diff>
--- a/presentations/BCBM Subtype Analysis.pptx
+++ b/presentations/BCBM Subtype Analysis.pptx
@@ -3357,7 +3357,7 @@
           <a:p>
             <a:r>
               <a:rPr lang="en-US" dirty="0"/>
-              <a:t>Subtype Analysis</a:t>
+              <a:t>BCBM HTMA438: Subtype Analysis</a:t>
             </a:r>
           </a:p>
         </p:txBody>
@@ -3389,8 +3389,13 @@
             </a:r>
             <a:r>
               <a:rPr lang="en-US" dirty="0"/>
-              <a:t> DSP Project</a:t>
-            </a:r>
+              <a:t> Digital </a:t>
+            </a:r>
+            <a:r>
+              <a:rPr lang="en-US"/>
+              <a:t>Spatial Profiling</a:t>
+            </a:r>
+            <a:endParaRPr lang="en-US" dirty="0"/>
           </a:p>
         </p:txBody>
       </p:sp>

</xml_diff>